<commit_message>
Update edited documents and replace Summary Capstone with Autobiography Summary
</commit_message>
<xml_diff>
--- a/assets/Biometrics & Cybersecurity.pptx
+++ b/assets/Biometrics & Cybersecurity.pptx
@@ -357,7 +357,7 @@
           <a:p>
             <a:fld id="{E748A721-3DEE-4A8A-8E5D-A083DCA5E7D6}" type="datetimeFigureOut">
               <a:rPr lang="en-US" smtClean="0"/>
-              <a:t>12/17/2025</a:t>
+              <a:t>12/18/2025</a:t>
             </a:fld>
             <a:endParaRPr lang="en-US"/>
           </a:p>
@@ -691,7 +691,7 @@
           <a:p>
             <a:fld id="{E748A721-3DEE-4A8A-8E5D-A083DCA5E7D6}" type="datetimeFigureOut">
               <a:rPr lang="en-US" smtClean="0"/>
-              <a:t>12/17/2025</a:t>
+              <a:t>12/18/2025</a:t>
             </a:fld>
             <a:endParaRPr lang="en-US"/>
           </a:p>
@@ -969,7 +969,7 @@
           <a:p>
             <a:fld id="{E748A721-3DEE-4A8A-8E5D-A083DCA5E7D6}" type="datetimeFigureOut">
               <a:rPr lang="en-US" smtClean="0"/>
-              <a:t>12/17/2025</a:t>
+              <a:t>12/18/2025</a:t>
             </a:fld>
             <a:endParaRPr lang="en-US"/>
           </a:p>
@@ -1537,7 +1537,7 @@
           <a:p>
             <a:fld id="{E748A721-3DEE-4A8A-8E5D-A083DCA5E7D6}" type="datetimeFigureOut">
               <a:rPr lang="en-US" smtClean="0"/>
-              <a:t>12/17/2025</a:t>
+              <a:t>12/18/2025</a:t>
             </a:fld>
             <a:endParaRPr lang="en-US"/>
           </a:p>
@@ -1815,7 +1815,7 @@
           <a:p>
             <a:fld id="{E748A721-3DEE-4A8A-8E5D-A083DCA5E7D6}" type="datetimeFigureOut">
               <a:rPr lang="en-US" smtClean="0"/>
-              <a:t>12/17/2025</a:t>
+              <a:t>12/18/2025</a:t>
             </a:fld>
             <a:endParaRPr lang="en-US"/>
           </a:p>
@@ -2377,7 +2377,7 @@
           <a:p>
             <a:fld id="{E748A721-3DEE-4A8A-8E5D-A083DCA5E7D6}" type="datetimeFigureOut">
               <a:rPr lang="en-US" smtClean="0"/>
-              <a:t>12/17/2025</a:t>
+              <a:t>12/18/2025</a:t>
             </a:fld>
             <a:endParaRPr lang="en-US"/>
           </a:p>
@@ -2704,7 +2704,7 @@
           <a:p>
             <a:fld id="{E748A721-3DEE-4A8A-8E5D-A083DCA5E7D6}" type="datetimeFigureOut">
               <a:rPr lang="en-US" smtClean="0"/>
-              <a:t>12/17/2025</a:t>
+              <a:t>12/18/2025</a:t>
             </a:fld>
             <a:endParaRPr lang="en-US"/>
           </a:p>
@@ -2881,7 +2881,7 @@
           <a:p>
             <a:fld id="{E748A721-3DEE-4A8A-8E5D-A083DCA5E7D6}" type="datetimeFigureOut">
               <a:rPr lang="en-US" smtClean="0"/>
-              <a:t>12/17/2025</a:t>
+              <a:t>12/18/2025</a:t>
             </a:fld>
             <a:endParaRPr lang="en-US"/>
           </a:p>
@@ -3119,7 +3119,7 @@
           <a:p>
             <a:fld id="{E748A721-3DEE-4A8A-8E5D-A083DCA5E7D6}" type="datetimeFigureOut">
               <a:rPr lang="en-US" smtClean="0"/>
-              <a:t>12/17/2025</a:t>
+              <a:t>12/18/2025</a:t>
             </a:fld>
             <a:endParaRPr lang="en-US"/>
           </a:p>
@@ -3319,7 +3319,7 @@
           <a:p>
             <a:fld id="{E748A721-3DEE-4A8A-8E5D-A083DCA5E7D6}" type="datetimeFigureOut">
               <a:rPr lang="en-US" smtClean="0"/>
-              <a:t>12/17/2025</a:t>
+              <a:t>12/18/2025</a:t>
             </a:fld>
             <a:endParaRPr lang="en-US"/>
           </a:p>
@@ -3595,7 +3595,7 @@
           <a:p>
             <a:fld id="{E748A721-3DEE-4A8A-8E5D-A083DCA5E7D6}" type="datetimeFigureOut">
               <a:rPr lang="en-US" smtClean="0"/>
-              <a:t>12/17/2025</a:t>
+              <a:t>12/18/2025</a:t>
             </a:fld>
             <a:endParaRPr lang="en-US"/>
           </a:p>
@@ -3861,7 +3861,7 @@
           <a:p>
             <a:fld id="{E748A721-3DEE-4A8A-8E5D-A083DCA5E7D6}" type="datetimeFigureOut">
               <a:rPr lang="en-US" smtClean="0"/>
-              <a:t>12/17/2025</a:t>
+              <a:t>12/18/2025</a:t>
             </a:fld>
             <a:endParaRPr lang="en-US"/>
           </a:p>
@@ -4235,7 +4235,7 @@
           <a:p>
             <a:fld id="{E748A721-3DEE-4A8A-8E5D-A083DCA5E7D6}" type="datetimeFigureOut">
               <a:rPr lang="en-US" smtClean="0"/>
-              <a:t>12/17/2025</a:t>
+              <a:t>12/18/2025</a:t>
             </a:fld>
             <a:endParaRPr lang="en-US"/>
           </a:p>
@@ -4383,7 +4383,7 @@
           <a:p>
             <a:fld id="{E748A721-3DEE-4A8A-8E5D-A083DCA5E7D6}" type="datetimeFigureOut">
               <a:rPr lang="en-US" smtClean="0"/>
-              <a:t>12/17/2025</a:t>
+              <a:t>12/18/2025</a:t>
             </a:fld>
             <a:endParaRPr lang="en-US"/>
           </a:p>
@@ -4508,7 +4508,7 @@
           <a:p>
             <a:fld id="{E748A721-3DEE-4A8A-8E5D-A083DCA5E7D6}" type="datetimeFigureOut">
               <a:rPr lang="en-US" smtClean="0"/>
-              <a:t>12/17/2025</a:t>
+              <a:t>12/18/2025</a:t>
             </a:fld>
             <a:endParaRPr lang="en-US"/>
           </a:p>
@@ -4793,7 +4793,7 @@
           <a:p>
             <a:fld id="{E748A721-3DEE-4A8A-8E5D-A083DCA5E7D6}" type="datetimeFigureOut">
               <a:rPr lang="en-US" smtClean="0"/>
-              <a:t>12/17/2025</a:t>
+              <a:t>12/18/2025</a:t>
             </a:fld>
             <a:endParaRPr lang="en-US"/>
           </a:p>
@@ -5117,7 +5117,7 @@
           <a:p>
             <a:fld id="{E748A721-3DEE-4A8A-8E5D-A083DCA5E7D6}" type="datetimeFigureOut">
               <a:rPr lang="en-US" smtClean="0"/>
-              <a:t>12/17/2025</a:t>
+              <a:t>12/18/2025</a:t>
             </a:fld>
             <a:endParaRPr lang="en-US"/>
           </a:p>
@@ -5331,7 +5331,7 @@
           <a:p>
             <a:fld id="{E748A721-3DEE-4A8A-8E5D-A083DCA5E7D6}" type="datetimeFigureOut">
               <a:rPr lang="en-US" smtClean="0"/>
-              <a:t>12/17/2025</a:t>
+              <a:t>12/18/2025</a:t>
             </a:fld>
             <a:endParaRPr lang="en-US"/>
           </a:p>
@@ -7453,11 +7453,7 @@
             </a:r>
             <a:r>
               <a:rPr lang="en-US" sz="3200" b="1" dirty="0" smtClean="0"/>
-              <a:t>- </a:t>
-            </a:r>
-            <a:r>
-              <a:rPr lang="en-US" sz="3200" b="1" dirty="0" smtClean="0"/>
-              <a:t>Biometric </a:t>
+              <a:t>- Biometric </a:t>
             </a:r>
             <a:r>
               <a:rPr lang="en-US" sz="3200" b="1" dirty="0"/>

</xml_diff>